<commit_message>
Minor updates to pptx v2
</commit_message>
<xml_diff>
--- a/documentation/good_model_structure_v2.pptx
+++ b/documentation/good_model_structure_v2.pptx
@@ -3743,15 +3743,15 @@
           </p:cNvPr>
           <p:cNvCxnSpPr>
             <a:cxnSpLocks/>
-            <a:stCxn id="9" idx="3"/>
-            <a:endCxn id="10" idx="1"/>
+            <a:stCxn id="3" idx="0"/>
+            <a:endCxn id="9" idx="2"/>
           </p:cNvCxnSpPr>
           <p:nvPr/>
         </p:nvCxnSpPr>
         <p:spPr>
-          <a:xfrm flipV="1">
-            <a:off x="7291752" y="2182236"/>
-            <a:ext cx="1354017" cy="1"/>
+          <a:xfrm flipH="1" flipV="1">
+            <a:off x="6220557" y="2428458"/>
+            <a:ext cx="21615" cy="1563374"/>
           </a:xfrm>
           <a:prstGeom prst="straightConnector1">
             <a:avLst/>
@@ -3760,6 +3760,7 @@
             <a:solidFill>
               <a:schemeClr val="tx1"/>
             </a:solidFill>
+            <a:prstDash val="dash"/>
             <a:tailEnd type="triangle"/>
           </a:ln>
         </p:spPr>
@@ -3858,6 +3859,126 @@
               <a:schemeClr val="tx1"/>
             </a:solidFill>
             <a:prstDash val="dash"/>
+            <a:tailEnd type="triangle"/>
+          </a:ln>
+        </p:spPr>
+        <p:style>
+          <a:lnRef idx="2">
+            <a:schemeClr val="accent1"/>
+          </a:lnRef>
+          <a:fillRef idx="0">
+            <a:schemeClr val="accent1"/>
+          </a:fillRef>
+          <a:effectRef idx="1">
+            <a:schemeClr val="accent1"/>
+          </a:effectRef>
+          <a:fontRef idx="minor">
+            <a:schemeClr val="tx1"/>
+          </a:fontRef>
+        </p:style>
+      </p:cxnSp>
+      <p:sp>
+        <p:nvSpPr>
+          <p:cNvPr id="3" name="TextBox 2">
+            <a:extLst>
+              <a:ext uri="{FF2B5EF4-FFF2-40B4-BE49-F238E27FC236}">
+                <a16:creationId xmlns:a16="http://schemas.microsoft.com/office/drawing/2014/main" id="{91DB125A-BCD8-6FFA-E68B-F3B17B072419}"/>
+              </a:ext>
+            </a:extLst>
+          </p:cNvPr>
+          <p:cNvSpPr txBox="1"/>
+          <p:nvPr/>
+        </p:nvSpPr>
+        <p:spPr>
+          <a:xfrm>
+            <a:off x="4985972" y="3991832"/>
+            <a:ext cx="2512400" cy="523220"/>
+          </a:xfrm>
+          <a:prstGeom prst="rect">
+            <a:avLst/>
+          </a:prstGeom>
+          <a:noFill/>
+          <a:ln>
+            <a:noFill/>
+          </a:ln>
+        </p:spPr>
+        <p:txBody>
+          <a:bodyPr wrap="square" rtlCol="0">
+            <a:spAutoFit/>
+          </a:bodyPr>
+          <a:lstStyle/>
+          <a:p>
+            <a:pPr algn="ctr"/>
+            <a:r>
+              <a:rPr lang="en-US" sz="2800" b="1" i="1" dirty="0"/>
+              <a:t>🪄</a:t>
+            </a:r>
+            <a:r>
+              <a:rPr lang="en-US" sz="2800" b="1" i="1" dirty="0">
+                <a:solidFill>
+                  <a:schemeClr val="accent5">
+                    <a:lumMod val="40000"/>
+                    <a:lumOff val="60000"/>
+                  </a:schemeClr>
+                </a:solidFill>
+              </a:rPr>
+              <a:t> </a:t>
+            </a:r>
+            <a:r>
+              <a:rPr lang="en-US" sz="2800" b="1" i="1" dirty="0">
+                <a:solidFill>
+                  <a:schemeClr val="accent5">
+                    <a:lumMod val="75000"/>
+                  </a:schemeClr>
+                </a:solidFill>
+              </a:rPr>
+              <a:t>MAGIC</a:t>
+            </a:r>
+            <a:r>
+              <a:rPr lang="en-US" sz="2800" b="1" i="1" dirty="0">
+                <a:solidFill>
+                  <a:schemeClr val="accent5">
+                    <a:lumMod val="40000"/>
+                    <a:lumOff val="60000"/>
+                  </a:schemeClr>
+                </a:solidFill>
+              </a:rPr>
+              <a:t> </a:t>
+            </a:r>
+            <a:r>
+              <a:rPr lang="en-US" sz="2800" b="1" i="1" dirty="0"/>
+              <a:t>🪄</a:t>
+            </a:r>
+          </a:p>
+        </p:txBody>
+      </p:sp>
+      <p:cxnSp>
+        <p:nvCxnSpPr>
+          <p:cNvPr id="23" name="Straight Arrow Connector 22">
+            <a:extLst>
+              <a:ext uri="{FF2B5EF4-FFF2-40B4-BE49-F238E27FC236}">
+                <a16:creationId xmlns:a16="http://schemas.microsoft.com/office/drawing/2014/main" id="{BF06AA20-23EC-371D-D683-C06765CC74DF}"/>
+              </a:ext>
+            </a:extLst>
+          </p:cNvPr>
+          <p:cNvCxnSpPr>
+            <a:cxnSpLocks/>
+            <a:endCxn id="10" idx="1"/>
+          </p:cNvCxnSpPr>
+          <p:nvPr/>
+        </p:nvCxnSpPr>
+        <p:spPr>
+          <a:xfrm>
+            <a:off x="7291752" y="2178478"/>
+            <a:ext cx="1354017" cy="3758"/>
+          </a:xfrm>
+          <a:prstGeom prst="straightConnector1">
+            <a:avLst/>
+          </a:prstGeom>
+          <a:ln w="38100">
+            <a:solidFill>
+              <a:schemeClr val="tx1"/>
+            </a:solidFill>
             <a:tailEnd type="triangle"/>
           </a:ln>
         </p:spPr>

</xml_diff>